<commit_message>
bulk of week 4
</commit_message>
<xml_diff>
--- a/week3/week3_basics.pptx
+++ b/week3/week3_basics.pptx
@@ -216,7 +216,7 @@
           <a:p>
             <a:fld id="{ABCC366A-A56A-4D61-850C-721D117971F4}" type="datetimeFigureOut">
               <a:rPr lang="en-US" smtClean="0"/>
-              <a:t>11/11/2025</a:t>
+              <a:t>11/16/2025</a:t>
             </a:fld>
             <a:endParaRPr lang="en-US"/>
           </a:p>
@@ -921,7 +921,7 @@
           <a:p>
             <a:fld id="{89347157-CD57-42FD-AB37-70B70B85F13E}" type="datetimeFigureOut">
               <a:rPr lang="en-US" smtClean="0"/>
-              <a:t>11/9/2025</a:t>
+              <a:t>11/16/2025</a:t>
             </a:fld>
             <a:endParaRPr lang="en-US"/>
           </a:p>
@@ -1100,7 +1100,7 @@
           <a:p>
             <a:fld id="{89347157-CD57-42FD-AB37-70B70B85F13E}" type="datetimeFigureOut">
               <a:rPr lang="en-US" smtClean="0"/>
-              <a:t>11/9/2025</a:t>
+              <a:t>11/16/2025</a:t>
             </a:fld>
             <a:endParaRPr lang="en-US"/>
           </a:p>
@@ -1280,7 +1280,7 @@
           <a:p>
             <a:fld id="{89347157-CD57-42FD-AB37-70B70B85F13E}" type="datetimeFigureOut">
               <a:rPr lang="en-US" smtClean="0"/>
-              <a:t>11/9/2025</a:t>
+              <a:t>11/16/2025</a:t>
             </a:fld>
             <a:endParaRPr lang="en-US"/>
           </a:p>
@@ -1450,7 +1450,7 @@
           <a:p>
             <a:fld id="{89347157-CD57-42FD-AB37-70B70B85F13E}" type="datetimeFigureOut">
               <a:rPr lang="en-US" smtClean="0"/>
-              <a:t>11/9/2025</a:t>
+              <a:t>11/16/2025</a:t>
             </a:fld>
             <a:endParaRPr lang="en-US"/>
           </a:p>
@@ -1770,7 +1770,7 @@
           <a:p>
             <a:fld id="{89347157-CD57-42FD-AB37-70B70B85F13E}" type="datetimeFigureOut">
               <a:rPr lang="en-US" smtClean="0"/>
-              <a:t>11/9/2025</a:t>
+              <a:t>11/16/2025</a:t>
             </a:fld>
             <a:endParaRPr lang="en-US"/>
           </a:p>
@@ -2170,7 +2170,7 @@
           <a:p>
             <a:fld id="{89347157-CD57-42FD-AB37-70B70B85F13E}" type="datetimeFigureOut">
               <a:rPr lang="en-US" smtClean="0"/>
-              <a:t>11/9/2025</a:t>
+              <a:t>11/16/2025</a:t>
             </a:fld>
             <a:endParaRPr lang="en-US"/>
           </a:p>
@@ -2604,7 +2604,7 @@
           <a:p>
             <a:fld id="{89347157-CD57-42FD-AB37-70B70B85F13E}" type="datetimeFigureOut">
               <a:rPr lang="en-US" smtClean="0"/>
-              <a:t>11/9/2025</a:t>
+              <a:t>11/16/2025</a:t>
             </a:fld>
             <a:endParaRPr lang="en-US"/>
           </a:p>
@@ -2722,7 +2722,7 @@
           <a:p>
             <a:fld id="{89347157-CD57-42FD-AB37-70B70B85F13E}" type="datetimeFigureOut">
               <a:rPr lang="en-US" smtClean="0"/>
-              <a:t>11/9/2025</a:t>
+              <a:t>11/16/2025</a:t>
             </a:fld>
             <a:endParaRPr lang="en-US"/>
           </a:p>
@@ -2817,7 +2817,7 @@
           <a:p>
             <a:fld id="{89347157-CD57-42FD-AB37-70B70B85F13E}" type="datetimeFigureOut">
               <a:rPr lang="en-US" smtClean="0"/>
-              <a:t>11/9/2025</a:t>
+              <a:t>11/16/2025</a:t>
             </a:fld>
             <a:endParaRPr lang="en-US"/>
           </a:p>
@@ -3174,7 +3174,7 @@
           <a:p>
             <a:fld id="{89347157-CD57-42FD-AB37-70B70B85F13E}" type="datetimeFigureOut">
               <a:rPr lang="en-US" smtClean="0"/>
-              <a:t>11/9/2025</a:t>
+              <a:t>11/16/2025</a:t>
             </a:fld>
             <a:endParaRPr lang="en-US"/>
           </a:p>
@@ -3620,7 +3620,7 @@
           <a:p>
             <a:fld id="{89347157-CD57-42FD-AB37-70B70B85F13E}" type="datetimeFigureOut">
               <a:rPr lang="en-US" smtClean="0"/>
-              <a:t>11/9/2025</a:t>
+              <a:t>11/16/2025</a:t>
             </a:fld>
             <a:endParaRPr lang="en-US"/>
           </a:p>
@@ -3915,7 +3915,7 @@
           <a:p>
             <a:fld id="{89347157-CD57-42FD-AB37-70B70B85F13E}" type="datetimeFigureOut">
               <a:rPr lang="en-US" smtClean="0"/>
-              <a:t>11/9/2025</a:t>
+              <a:t>11/16/2025</a:t>
             </a:fld>
             <a:endParaRPr lang="en-US"/>
           </a:p>
@@ -4563,8 +4563,12 @@
           <a:lstStyle/>
           <a:p>
             <a:r>
-              <a:rPr lang="en-US" dirty="0"/>
-              <a:t>Week 2 – Basics</a:t>
+              <a:rPr lang="en-US"/>
+              <a:t>Week 3 </a:t>
+            </a:r>
+            <a:r>
+              <a:rPr lang="en-US" dirty="0"/>
+              <a:t>– Basics</a:t>
             </a:r>
           </a:p>
         </p:txBody>
@@ -4846,8 +4850,8 @@
           </a:p>
         </p:txBody>
       </p:sp>
-      <mc:AlternateContent xmlns:mc="http://schemas.openxmlformats.org/markup-compatibility/2006">
-        <mc:Choice xmlns:a14="http://schemas.microsoft.com/office/drawing/2010/main" Requires="a14">
+      <mc:AlternateContent xmlns:mc="http://schemas.openxmlformats.org/markup-compatibility/2006" xmlns:a14="http://schemas.microsoft.com/office/drawing/2010/main">
+        <mc:Choice Requires="a14">
           <p:sp>
             <p:nvSpPr>
               <p:cNvPr id="3" name="Content Placeholder 2">
@@ -4879,7 +4883,9 @@
                     <m:sSub>
                       <m:sSubPr>
                         <m:ctrlPr>
-                          <a:rPr lang="ar-AE"/>
+                          <a:rPr lang="ar-AE" i="1">
+                            <a:latin typeface="Cambria Math" panose="02040503050406030204" pitchFamily="18" charset="0"/>
+                          </a:rPr>
                         </m:ctrlPr>
                       </m:sSubPr>
                       <m:e>
@@ -4887,13 +4893,17 @@
                           <m:rPr>
                             <m:sty m:val="p"/>
                           </m:rPr>
-                          <a:rPr lang="el-GR"/>
+                          <a:rPr lang="el-GR">
+                            <a:latin typeface="Cambria Math" panose="02040503050406030204" pitchFamily="18" charset="0"/>
+                          </a:rPr>
                           <m:t>Σ</m:t>
                         </m:r>
                       </m:e>
                       <m:sub>
                         <m:r>
-                          <a:rPr lang="ar-AE" i="1"/>
+                          <a:rPr lang="ar-AE" i="1">
+                            <a:latin typeface="Cambria Math" panose="02040503050406030204" pitchFamily="18" charset="0"/>
+                          </a:rPr>
                           <m:t>𝑔</m:t>
                         </m:r>
                       </m:sub>
@@ -4921,18 +4931,24 @@
                       <m:rPr>
                         <m:sty m:val="p"/>
                       </m:rPr>
-                      <a:rPr lang="el-GR"/>
+                      <a:rPr lang="el-GR">
+                        <a:latin typeface="Cambria Math" panose="02040503050406030204" pitchFamily="18" charset="0"/>
+                      </a:rPr>
                       <m:t>Σ</m:t>
                     </m:r>
                     <m:d>
                       <m:dPr>
                         <m:ctrlPr>
-                          <a:rPr lang="ar-AE" i="1"/>
+                          <a:rPr lang="ar-AE" i="1">
+                            <a:latin typeface="Cambria Math" panose="02040503050406030204" pitchFamily="18" charset="0"/>
+                          </a:rPr>
                         </m:ctrlPr>
                       </m:dPr>
                       <m:e>
                         <m:r>
-                          <a:rPr lang="ar-AE" i="1"/>
+                          <a:rPr lang="ar-AE" i="1">
+                            <a:latin typeface="Cambria Math" panose="02040503050406030204" pitchFamily="18" charset="0"/>
+                          </a:rPr>
                           <m:t>𝐸</m:t>
                         </m:r>
                       </m:e>
@@ -4952,18 +4968,24 @@
                 <a14:m>
                   <m:oMath xmlns:m="http://schemas.openxmlformats.org/officeDocument/2006/math">
                     <m:r>
-                      <a:rPr lang="en-US" i="1"/>
+                      <a:rPr lang="en-US" i="1">
+                        <a:latin typeface="Cambria Math" panose="02040503050406030204" pitchFamily="18" charset="0"/>
+                      </a:rPr>
                       <m:t>𝜙</m:t>
                     </m:r>
                     <m:d>
                       <m:dPr>
                         <m:ctrlPr>
-                          <a:rPr lang="ar-AE" i="1"/>
+                          <a:rPr lang="ar-AE" i="1">
+                            <a:latin typeface="Cambria Math" panose="02040503050406030204" pitchFamily="18" charset="0"/>
+                          </a:rPr>
                         </m:ctrlPr>
                       </m:dPr>
                       <m:e>
                         <m:r>
-                          <a:rPr lang="ar-AE" i="1"/>
+                          <a:rPr lang="ar-AE" i="1">
+                            <a:latin typeface="Cambria Math" panose="02040503050406030204" pitchFamily="18" charset="0"/>
+                          </a:rPr>
                           <m:t>𝐸</m:t>
                         </m:r>
                       </m:e>
@@ -4985,49 +5007,67 @@
                     <m:sSub>
                       <m:sSubPr>
                         <m:ctrlPr>
-                          <a:rPr lang="ar-AE"/>
+                          <a:rPr lang="ar-AE" i="1">
+                            <a:latin typeface="Cambria Math" panose="02040503050406030204" pitchFamily="18" charset="0"/>
+                          </a:rPr>
                         </m:ctrlPr>
                       </m:sSubPr>
                       <m:e>
                         <m:r>
-                          <a:rPr lang="ar-AE" i="1"/>
+                          <a:rPr lang="ar-AE" i="1">
+                            <a:latin typeface="Cambria Math" panose="02040503050406030204" pitchFamily="18" charset="0"/>
+                          </a:rPr>
                           <m:t>𝐸</m:t>
                         </m:r>
                       </m:e>
                       <m:sub>
                         <m:r>
-                          <a:rPr lang="ar-AE" i="1"/>
+                          <a:rPr lang="ar-AE" i="1">
+                            <a:latin typeface="Cambria Math" panose="02040503050406030204" pitchFamily="18" charset="0"/>
+                          </a:rPr>
                           <m:t>𝑔</m:t>
                         </m:r>
                         <m:r>
-                          <a:rPr lang="ar-AE"/>
+                          <a:rPr lang="ar-AE">
+                            <a:latin typeface="Cambria Math" panose="02040503050406030204" pitchFamily="18" charset="0"/>
+                          </a:rPr>
                           <m:t>−</m:t>
                         </m:r>
                         <m:r>
-                          <a:rPr lang="ar-AE"/>
+                          <a:rPr lang="ar-AE">
+                            <a:latin typeface="Cambria Math" panose="02040503050406030204" pitchFamily="18" charset="0"/>
+                          </a:rPr>
                           <m:t>1</m:t>
                         </m:r>
                       </m:sub>
                     </m:sSub>
                     <m:r>
-                      <a:rPr lang="ar-AE"/>
+                      <a:rPr lang="ar-AE">
+                        <a:latin typeface="Cambria Math" panose="02040503050406030204" pitchFamily="18" charset="0"/>
+                      </a:rPr>
                       <m:t>,</m:t>
                     </m:r>
                     <m:sSub>
                       <m:sSubPr>
                         <m:ctrlPr>
-                          <a:rPr lang="ar-AE" i="1"/>
+                          <a:rPr lang="ar-AE" i="1">
+                            <a:latin typeface="Cambria Math" panose="02040503050406030204" pitchFamily="18" charset="0"/>
+                          </a:rPr>
                         </m:ctrlPr>
                       </m:sSubPr>
                       <m:e>
                         <m:r>
-                          <a:rPr lang="ar-AE" i="1"/>
+                          <a:rPr lang="ar-AE" i="1">
+                            <a:latin typeface="Cambria Math" panose="02040503050406030204" pitchFamily="18" charset="0"/>
+                          </a:rPr>
                           <m:t>𝐸</m:t>
                         </m:r>
                       </m:e>
                       <m:sub>
                         <m:r>
-                          <a:rPr lang="ar-AE" i="1"/>
+                          <a:rPr lang="ar-AE" i="1">
+                            <a:latin typeface="Cambria Math" panose="02040503050406030204" pitchFamily="18" charset="0"/>
+                          </a:rPr>
                           <m:t>𝑔</m:t>
                         </m:r>
                       </m:sub>
@@ -5054,7 +5094,7 @@
             </p:txBody>
           </p:sp>
         </mc:Choice>
-        <mc:Fallback>
+        <mc:Fallback xmlns="">
           <p:sp>
             <p:nvSpPr>
               <p:cNvPr id="3" name="Content Placeholder 2">

</xml_diff>